<commit_message>
Kleine update n.a.v. discussie over rollen en identificatoren
</commit_message>
<xml_diff>
--- a/werkomgeving/presentaties/20251114-MIM relaties.pptx
+++ b/werkomgeving/presentaties/20251114-MIM relaties.pptx
@@ -204,7 +204,7 @@
           <a:p>
             <a:fld id="{F6BA0BEC-D659-49A0-BDC1-7AED8DDA2204}" type="datetimeFigureOut">
               <a:rPr lang="nl-NL" smtClean="0"/>
-              <a:t>13-11-2025</a:t>
+              <a:t>17-11-2025</a:t>
             </a:fld>
             <a:endParaRPr lang="nl-NL"/>
           </a:p>
@@ -1206,7 +1206,7 @@
             <a:fld id="{A2D4CE28-2779-4906-957D-A173F7999FCA}" type="datetime1">
               <a:rPr lang="nl-NL" smtClean="0"/>
               <a:pPr/>
-              <a:t>13-11-2025</a:t>
+              <a:t>17-11-2025</a:t>
             </a:fld>
             <a:endParaRPr lang="nl-NL" dirty="0"/>
           </a:p>
@@ -1503,7 +1503,7 @@
           <a:p>
             <a:fld id="{E0A2F211-4CA0-46C3-BAC9-237EE5A60786}" type="datetime1">
               <a:rPr lang="nl-NL" smtClean="0"/>
-              <a:t>13-11-2025</a:t>
+              <a:t>17-11-2025</a:t>
             </a:fld>
             <a:endParaRPr lang="nl-NL"/>
           </a:p>
@@ -1736,7 +1736,7 @@
           <a:p>
             <a:fld id="{E0A2F211-4CA0-46C3-BAC9-237EE5A60786}" type="datetime1">
               <a:rPr lang="nl-NL" smtClean="0"/>
-              <a:t>13-11-2025</a:t>
+              <a:t>17-11-2025</a:t>
             </a:fld>
             <a:endParaRPr lang="nl-NL"/>
           </a:p>
@@ -2029,7 +2029,7 @@
           <a:p>
             <a:fld id="{E0A2F211-4CA0-46C3-BAC9-237EE5A60786}" type="datetime1">
               <a:rPr lang="nl-NL" smtClean="0"/>
-              <a:t>13-11-2025</a:t>
+              <a:t>17-11-2025</a:t>
             </a:fld>
             <a:endParaRPr lang="nl-NL"/>
           </a:p>
@@ -2388,7 +2388,7 @@
           <a:p>
             <a:fld id="{E0A2F211-4CA0-46C3-BAC9-237EE5A60786}" type="datetime1">
               <a:rPr lang="nl-NL" smtClean="0"/>
-              <a:t>13-11-2025</a:t>
+              <a:t>17-11-2025</a:t>
             </a:fld>
             <a:endParaRPr lang="nl-NL"/>
           </a:p>
@@ -2712,7 +2712,7 @@
           <a:p>
             <a:fld id="{E0A2F211-4CA0-46C3-BAC9-237EE5A60786}" type="datetime1">
               <a:rPr lang="nl-NL" smtClean="0"/>
-              <a:t>13-11-2025</a:t>
+              <a:t>17-11-2025</a:t>
             </a:fld>
             <a:endParaRPr lang="nl-NL"/>
           </a:p>
@@ -3054,7 +3054,7 @@
           <a:p>
             <a:fld id="{E0A2F211-4CA0-46C3-BAC9-237EE5A60786}" type="datetime1">
               <a:rPr lang="nl-NL" smtClean="0"/>
-              <a:t>13-11-2025</a:t>
+              <a:t>17-11-2025</a:t>
             </a:fld>
             <a:endParaRPr lang="nl-NL"/>
           </a:p>
@@ -3433,7 +3433,7 @@
           <a:p>
             <a:fld id="{E0A2F211-4CA0-46C3-BAC9-237EE5A60786}" type="datetime1">
               <a:rPr lang="nl-NL" smtClean="0"/>
-              <a:t>13-11-2025</a:t>
+              <a:t>17-11-2025</a:t>
             </a:fld>
             <a:endParaRPr lang="nl-NL"/>
           </a:p>
@@ -3767,7 +3767,7 @@
           <a:p>
             <a:fld id="{E0A2F211-4CA0-46C3-BAC9-237EE5A60786}" type="datetime1">
               <a:rPr lang="nl-NL" smtClean="0"/>
-              <a:t>13-11-2025</a:t>
+              <a:t>17-11-2025</a:t>
             </a:fld>
             <a:endParaRPr lang="nl-NL"/>
           </a:p>
@@ -4101,7 +4101,7 @@
           <a:p>
             <a:fld id="{E0A2F211-4CA0-46C3-BAC9-237EE5A60786}" type="datetime1">
               <a:rPr lang="nl-NL" smtClean="0"/>
-              <a:t>13-11-2025</a:t>
+              <a:t>17-11-2025</a:t>
             </a:fld>
             <a:endParaRPr lang="nl-NL"/>
           </a:p>
@@ -4253,7 +4253,7 @@
           <a:p>
             <a:fld id="{A505C2FD-3A9E-4FB6-9665-708E4478422C}" type="datetime1">
               <a:rPr lang="nl-NL" smtClean="0"/>
-              <a:t>13-11-2025</a:t>
+              <a:t>17-11-2025</a:t>
             </a:fld>
             <a:endParaRPr lang="nl-NL"/>
           </a:p>
@@ -5175,7 +5175,7 @@
           <a:p>
             <a:fld id="{472D8C46-45ED-4977-8DF5-FEAAF18B775F}" type="datetime1">
               <a:rPr lang="nl-NL" smtClean="0"/>
-              <a:t>13-11-2025</a:t>
+              <a:t>17-11-2025</a:t>
             </a:fld>
             <a:endParaRPr lang="nl-NL"/>
           </a:p>
@@ -5317,7 +5317,7 @@
           <a:p>
             <a:fld id="{472D8C46-45ED-4977-8DF5-FEAAF18B775F}" type="datetime1">
               <a:rPr lang="nl-NL" smtClean="0"/>
-              <a:t>13-11-2025</a:t>
+              <a:t>17-11-2025</a:t>
             </a:fld>
             <a:endParaRPr lang="nl-NL"/>
           </a:p>
@@ -5859,7 +5859,7 @@
           <a:p>
             <a:fld id="{472D8C46-45ED-4977-8DF5-FEAAF18B775F}" type="datetime1">
               <a:rPr lang="nl-NL" smtClean="0"/>
-              <a:t>13-11-2025</a:t>
+              <a:t>17-11-2025</a:t>
             </a:fld>
             <a:endParaRPr lang="nl-NL"/>
           </a:p>
@@ -6801,7 +6801,7 @@
           <a:p>
             <a:fld id="{472D8C46-45ED-4977-8DF5-FEAAF18B775F}" type="datetime1">
               <a:rPr lang="nl-NL" smtClean="0"/>
-              <a:t>13-11-2025</a:t>
+              <a:t>17-11-2025</a:t>
             </a:fld>
             <a:endParaRPr lang="nl-NL"/>
           </a:p>
@@ -10389,7 +10389,7 @@
           <a:p>
             <a:fld id="{97D724BB-B06D-456B-989F-E4E6B54E3121}" type="datetime1">
               <a:rPr lang="nl-NL" smtClean="0"/>
-              <a:t>13-11-2025</a:t>
+              <a:t>17-11-2025</a:t>
             </a:fld>
             <a:endParaRPr lang="nl-NL"/>
           </a:p>
@@ -10502,7 +10502,7 @@
           <a:p>
             <a:fld id="{406088AE-63DC-4099-90B6-C0DEFB5E6602}" type="datetime1">
               <a:rPr lang="nl-NL" smtClean="0"/>
-              <a:t>13-11-2025</a:t>
+              <a:t>17-11-2025</a:t>
             </a:fld>
             <a:endParaRPr lang="nl-NL"/>
           </a:p>
@@ -10649,7 +10649,7 @@
           <a:p>
             <a:fld id="{97D724BB-B06D-456B-989F-E4E6B54E3121}" type="datetime1">
               <a:rPr lang="nl-NL" smtClean="0"/>
-              <a:t>13-11-2025</a:t>
+              <a:t>17-11-2025</a:t>
             </a:fld>
             <a:endParaRPr lang="nl-NL"/>
           </a:p>
@@ -10927,7 +10927,7 @@
           <a:p>
             <a:fld id="{472D8C46-45ED-4977-8DF5-FEAAF18B775F}" type="datetime1">
               <a:rPr lang="nl-NL" smtClean="0"/>
-              <a:t>13-11-2025</a:t>
+              <a:t>17-11-2025</a:t>
             </a:fld>
             <a:endParaRPr lang="nl-NL"/>
           </a:p>
@@ -14897,7 +14897,7 @@
             <a:fld id="{A2D4CE28-2779-4906-957D-A173F7999FCA}" type="datetime1">
               <a:rPr lang="nl-NL" smtClean="0"/>
               <a:pPr/>
-              <a:t>13-11-2025</a:t>
+              <a:t>17-11-2025</a:t>
             </a:fld>
             <a:endParaRPr lang="nl-NL" dirty="0"/>
           </a:p>
@@ -15690,7 +15690,7 @@
             <a:fld id="{002A0C75-8C73-4BC2-A110-8B70C26DE224}" type="datetime1">
               <a:rPr lang="nl-NL" smtClean="0"/>
               <a:pPr/>
-              <a:t>13-11-2025</a:t>
+              <a:t>17-11-2025</a:t>
             </a:fld>
             <a:endParaRPr lang="nl-NL" dirty="0"/>
           </a:p>
@@ -16511,7 +16511,7 @@
             <a:fld id="{A2D4CE28-2779-4906-957D-A173F7999FCA}" type="datetime1">
               <a:rPr lang="nl-NL" smtClean="0"/>
               <a:pPr/>
-              <a:t>13-11-2025</a:t>
+              <a:t>17-11-2025</a:t>
             </a:fld>
             <a:endParaRPr lang="nl-NL" dirty="0"/>
           </a:p>
@@ -16795,7 +16795,7 @@
           <a:p>
             <a:fld id="{B234C477-5CCC-4E58-9207-9007DC239AB4}" type="datetime1">
               <a:rPr lang="nl-NL" smtClean="0"/>
-              <a:t>13-11-2025</a:t>
+              <a:t>17-11-2025</a:t>
             </a:fld>
             <a:endParaRPr lang="nl-NL" dirty="0"/>
           </a:p>
@@ -17096,7 +17096,7 @@
           <a:p>
             <a:fld id="{B234C477-5CCC-4E58-9207-9007DC239AB4}" type="datetime1">
               <a:rPr lang="nl-NL" smtClean="0"/>
-              <a:t>13-11-2025</a:t>
+              <a:t>17-11-2025</a:t>
             </a:fld>
             <a:endParaRPr lang="nl-NL" dirty="0"/>
           </a:p>
@@ -17397,7 +17397,7 @@
           <a:p>
             <a:fld id="{B234C477-5CCC-4E58-9207-9007DC239AB4}" type="datetime1">
               <a:rPr lang="nl-NL" smtClean="0"/>
-              <a:t>13-11-2025</a:t>
+              <a:t>17-11-2025</a:t>
             </a:fld>
             <a:endParaRPr lang="nl-NL" dirty="0"/>
           </a:p>
@@ -17693,7 +17693,7 @@
             <a:fld id="{002A0C75-8C73-4BC2-A110-8B70C26DE224}" type="datetime1">
               <a:rPr lang="nl-NL" smtClean="0"/>
               <a:pPr/>
-              <a:t>13-11-2025</a:t>
+              <a:t>17-11-2025</a:t>
             </a:fld>
             <a:endParaRPr lang="nl-NL" dirty="0"/>
           </a:p>
@@ -19027,7 +19027,23 @@
             </a:r>
             <a:r>
               <a:rPr lang="en-NL" sz="1600" dirty="0"/>
-              <a:t> van de association zijn, dus </a:t>
+              <a:t> van de association zijn </a:t>
+            </a:r>
+            <a:r>
+              <a:rPr lang="en-NL" sz="1600" i="1" dirty="0"/>
+              <a:t>(owned</a:t>
+            </a:r>
+            <a:r>
+              <a:rPr lang="en-NL" sz="1600" dirty="0"/>
+              <a:t>)</a:t>
+            </a:r>
+            <a:r>
+              <a:rPr lang="en-NL" sz="1600" i="1" dirty="0"/>
+              <a:t>,</a:t>
+            </a:r>
+            <a:r>
+              <a:rPr lang="en-NL" sz="1600" dirty="0"/>
+              <a:t> dus </a:t>
             </a:r>
             <a:r>
               <a:rPr lang="en-NL" sz="1600" i="1" dirty="0"/>
@@ -19129,7 +19145,15 @@
             </a:r>
             <a:r>
               <a:rPr lang="en-NL" sz="1600" dirty="0"/>
-              <a:t> is</a:t>
+              <a:t> is (</a:t>
+            </a:r>
+            <a:r>
+              <a:rPr lang="en-NL" sz="1600" i="1" dirty="0"/>
+              <a:t>owned</a:t>
+            </a:r>
+            <a:r>
+              <a:rPr lang="en-NL" sz="1600" dirty="0"/>
+              <a:t>)</a:t>
             </a:r>
           </a:p>
           <a:p>
@@ -20677,7 +20701,7 @@
             </a:r>
             <a:r>
               <a:rPr lang="en-NL" dirty="0"/>
-              <a:t>e rol nodig is voor de identificatie</a:t>
+              <a:t>e relatie c.q. rol nodig is voor om de identificatie te bepalen</a:t>
             </a:r>
           </a:p>
           <a:p>
@@ -21059,8 +21083,13 @@
             </a:r>
             <a:r>
               <a:rPr lang="en-NL" dirty="0"/>
-              <a:t>geattribueerd aan het objecttype, om domeinobjecten van zo’n objecttype te kunnen identificeren.</a:t>
-            </a:r>
+              <a:t>relevant voor het objecttype, om domeinobjecten van zo’n objecttype te </a:t>
+            </a:r>
+            <a:r>
+              <a:rPr lang="en-NL"/>
+              <a:t>kunnen identificeren: via de rol en de relatie wordt duidelijk hoe de indentificatie er uit ziet</a:t>
+            </a:r>
+            <a:endParaRPr lang="en-NL" dirty="0"/>
           </a:p>
         </p:txBody>
       </p:sp>

</xml_diff>